<commit_message>
Getting this repository up to date
</commit_message>
<xml_diff>
--- a/presentatie.pptx
+++ b/presentatie.pptx
@@ -361,7 +361,7 @@
             <a:fld id="{8C6F6815-A51B-4A22-9161-5FE7BFADE1A3}" type="datetimeFigureOut">
               <a:rPr lang="en-GB" smtClean="0"/>
               <a:pPr/>
-              <a:t>02/04/2019</a:t>
+              <a:t>23/04/2019</a:t>
             </a:fld>
             <a:endParaRPr lang="en-GB"/>
           </a:p>
@@ -11180,7 +11180,7 @@
           <p:nvPr>
             <p:extLst>
               <p:ext uri="{D42A27DB-BD31-4B8C-83A1-F6EECF244321}">
-                <p14:modId xmlns:p14="http://schemas.microsoft.com/office/powerpoint/2010/main" val="1106734653"/>
+                <p14:modId xmlns:p14="http://schemas.microsoft.com/office/powerpoint/2010/main" val="821933527"/>
               </p:ext>
             </p:extLst>
           </p:nvPr>
@@ -11408,10 +11408,10 @@
                     <a:lstStyle/>
                     <a:p>
                       <a:r>
-                        <a:rPr lang="en-US" sz="1400" dirty="0" err="1">
+                        <a:rPr lang="en-US" sz="1400" dirty="0">
                           <a:latin typeface="Bahnschrift" panose="020B0502040204020203" pitchFamily="34" charset="0"/>
                         </a:rPr>
-                        <a:t>NoAction</a:t>
+                        <a:t>drop</a:t>
                       </a:r>
                       <a:endParaRPr lang="en-NL" sz="1400" dirty="0">
                         <a:latin typeface="Bahnschrift" panose="020B0502040204020203" pitchFamily="34" charset="0"/>
@@ -14946,7 +14946,7 @@
         </p:nvSpPr>
         <p:spPr bwMode="gray">
           <a:xfrm>
-            <a:off x="918398" y="2970771"/>
+            <a:off x="918396" y="2932040"/>
             <a:ext cx="2917369" cy="741680"/>
           </a:xfrm>
           <a:prstGeom prst="ellipse">
@@ -15593,7 +15593,7 @@
         </p:nvSpPr>
         <p:spPr bwMode="gray">
           <a:xfrm>
-            <a:off x="918398" y="2970771"/>
+            <a:off x="918398" y="2929209"/>
             <a:ext cx="2917369" cy="741680"/>
           </a:xfrm>
           <a:prstGeom prst="ellipse">
@@ -21269,71 +21269,12 @@
           <a:chExt cx="0" cy="0"/>
         </a:xfrm>
       </p:grpSpPr>
-      <p:sp>
-        <p:nvSpPr>
-          <p:cNvPr id="6" name="Tijdelijke aanduiding voor dianummer 5">
+      <p:pic>
+        <p:nvPicPr>
+          <p:cNvPr id="2" name="Afbeelding 1">
             <a:extLst>
               <a:ext uri="{FF2B5EF4-FFF2-40B4-BE49-F238E27FC236}">
-                <a16:creationId xmlns:a16="http://schemas.microsoft.com/office/drawing/2014/main" id="{090293F3-B8D3-4FB9-9D3E-2A67299E28B8}"/>
-              </a:ext>
-            </a:extLst>
-          </p:cNvPr>
-          <p:cNvSpPr>
-            <a:spLocks noGrp="1"/>
-          </p:cNvSpPr>
-          <p:nvPr>
-            <p:ph type="sldNum" sz="quarter" idx="15"/>
-          </p:nvPr>
-        </p:nvSpPr>
-        <p:spPr/>
-        <p:txBody>
-          <a:bodyPr/>
-          <a:lstStyle/>
-          <a:p>
-            <a:fld id="{253C79A4-34D5-4A22-8B02-BB0B9B92D27D}" type="slidenum">
-              <a:rPr lang="en-GB" smtClean="0"/>
-              <a:pPr/>
-              <a:t>9</a:t>
-            </a:fld>
-            <a:endParaRPr lang="en-GB" dirty="0"/>
-          </a:p>
-        </p:txBody>
-      </p:sp>
-      <p:sp>
-        <p:nvSpPr>
-          <p:cNvPr id="7" name="Tijdelijke aanduiding voor voettekst 6">
-            <a:extLst>
-              <a:ext uri="{FF2B5EF4-FFF2-40B4-BE49-F238E27FC236}">
-                <a16:creationId xmlns:a16="http://schemas.microsoft.com/office/drawing/2014/main" id="{1CA3F56C-2867-4E82-8BC9-CC15B4A55F1C}"/>
-              </a:ext>
-            </a:extLst>
-          </p:cNvPr>
-          <p:cNvSpPr>
-            <a:spLocks noGrp="1"/>
-          </p:cNvSpPr>
-          <p:nvPr>
-            <p:ph type="ftr" sz="quarter" idx="3"/>
-          </p:nvPr>
-        </p:nvSpPr>
-        <p:spPr/>
-        <p:txBody>
-          <a:bodyPr/>
-          <a:lstStyle/>
-          <a:p>
-            <a:r>
-              <a:rPr lang="nl-NL"/>
-              <a:t>Marlou Pors</a:t>
-            </a:r>
-            <a:endParaRPr lang="nl-NL" dirty="0"/>
-          </a:p>
-        </p:txBody>
-      </p:sp>
-      <p:pic>
-        <p:nvPicPr>
-          <p:cNvPr id="10" name="Afbeelding 9">
-            <a:extLst>
-              <a:ext uri="{FF2B5EF4-FFF2-40B4-BE49-F238E27FC236}">
-                <a16:creationId xmlns:a16="http://schemas.microsoft.com/office/drawing/2014/main" id="{B1B300C2-3995-4B6E-9D54-D4B4164D5DBF}"/>
+                <a16:creationId xmlns:a16="http://schemas.microsoft.com/office/drawing/2014/main" id="{E967C76C-F4C8-4C2D-9725-2B99D3627587}"/>
               </a:ext>
             </a:extLst>
           </p:cNvPr>
@@ -21350,44 +21291,73 @@
         </p:blipFill>
         <p:spPr>
           <a:xfrm>
-            <a:off x="315835" y="795455"/>
-            <a:ext cx="3542300" cy="3752734"/>
+            <a:off x="4409237" y="882829"/>
+            <a:ext cx="4321103" cy="3524941"/>
           </a:xfrm>
           <a:prstGeom prst="rect">
             <a:avLst/>
           </a:prstGeom>
         </p:spPr>
       </p:pic>
-      <p:pic>
-        <p:nvPicPr>
-          <p:cNvPr id="11" name="Afbeelding 10">
+      <p:sp>
+        <p:nvSpPr>
+          <p:cNvPr id="6" name="Tijdelijke aanduiding voor dianummer 5">
             <a:extLst>
               <a:ext uri="{FF2B5EF4-FFF2-40B4-BE49-F238E27FC236}">
-                <a16:creationId xmlns:a16="http://schemas.microsoft.com/office/drawing/2014/main" id="{A4FFAB73-23F1-456D-A766-D23234851769}"/>
+                <a16:creationId xmlns:a16="http://schemas.microsoft.com/office/drawing/2014/main" id="{090293F3-B8D3-4FB9-9D3E-2A67299E28B8}"/>
               </a:ext>
             </a:extLst>
           </p:cNvPr>
-          <p:cNvPicPr>
-            <a:picLocks noChangeAspect="1"/>
-          </p:cNvPicPr>
-          <p:nvPr/>
-        </p:nvPicPr>
-        <p:blipFill>
-          <a:blip r:embed="rId3"/>
-          <a:stretch>
-            <a:fillRect/>
-          </a:stretch>
-        </p:blipFill>
-        <p:spPr>
-          <a:xfrm>
-            <a:off x="4485974" y="943150"/>
-            <a:ext cx="4236789" cy="3457343"/>
-          </a:xfrm>
-          <a:prstGeom prst="rect">
-            <a:avLst/>
-          </a:prstGeom>
-        </p:spPr>
-      </p:pic>
+          <p:cNvSpPr>
+            <a:spLocks noGrp="1"/>
+          </p:cNvSpPr>
+          <p:nvPr>
+            <p:ph type="sldNum" sz="quarter" idx="15"/>
+          </p:nvPr>
+        </p:nvSpPr>
+        <p:spPr/>
+        <p:txBody>
+          <a:bodyPr/>
+          <a:lstStyle/>
+          <a:p>
+            <a:fld id="{253C79A4-34D5-4A22-8B02-BB0B9B92D27D}" type="slidenum">
+              <a:rPr lang="en-GB" smtClean="0"/>
+              <a:pPr/>
+              <a:t>9</a:t>
+            </a:fld>
+            <a:endParaRPr lang="en-GB" dirty="0"/>
+          </a:p>
+        </p:txBody>
+      </p:sp>
+      <p:sp>
+        <p:nvSpPr>
+          <p:cNvPr id="7" name="Tijdelijke aanduiding voor voettekst 6">
+            <a:extLst>
+              <a:ext uri="{FF2B5EF4-FFF2-40B4-BE49-F238E27FC236}">
+                <a16:creationId xmlns:a16="http://schemas.microsoft.com/office/drawing/2014/main" id="{1CA3F56C-2867-4E82-8BC9-CC15B4A55F1C}"/>
+              </a:ext>
+            </a:extLst>
+          </p:cNvPr>
+          <p:cNvSpPr>
+            <a:spLocks noGrp="1"/>
+          </p:cNvSpPr>
+          <p:nvPr>
+            <p:ph type="ftr" sz="quarter" idx="3"/>
+          </p:nvPr>
+        </p:nvSpPr>
+        <p:spPr/>
+        <p:txBody>
+          <a:bodyPr/>
+          <a:lstStyle/>
+          <a:p>
+            <a:r>
+              <a:rPr lang="nl-NL"/>
+              <a:t>Marlou Pors</a:t>
+            </a:r>
+            <a:endParaRPr lang="nl-NL" dirty="0"/>
+          </a:p>
+        </p:txBody>
+      </p:sp>
       <p:sp>
         <p:nvSpPr>
           <p:cNvPr id="13" name="Ovaal 12">
@@ -21447,7 +21417,7 @@
           <p:nvPr/>
         </p:nvPicPr>
         <p:blipFill>
-          <a:blip r:embed="rId4">
+          <a:blip r:embed="rId3">
             <a:extLst>
               <a:ext uri="{28A0092B-C50C-407E-A947-70E740481C1C}">
                 <a14:useLocalDpi xmlns:a14="http://schemas.microsoft.com/office/drawing/2010/main" val="0"/>
@@ -21700,6 +21670,36 @@
           </a:p>
         </p:txBody>
       </p:sp>
+      <p:pic>
+        <p:nvPicPr>
+          <p:cNvPr id="3" name="Afbeelding 2">
+            <a:extLst>
+              <a:ext uri="{FF2B5EF4-FFF2-40B4-BE49-F238E27FC236}">
+                <a16:creationId xmlns:a16="http://schemas.microsoft.com/office/drawing/2014/main" id="{9D024258-CD7E-484E-A102-15AB9801001B}"/>
+              </a:ext>
+            </a:extLst>
+          </p:cNvPr>
+          <p:cNvPicPr>
+            <a:picLocks noChangeAspect="1"/>
+          </p:cNvPicPr>
+          <p:nvPr/>
+        </p:nvPicPr>
+        <p:blipFill>
+          <a:blip r:embed="rId4"/>
+          <a:stretch>
+            <a:fillRect/>
+          </a:stretch>
+        </p:blipFill>
+        <p:spPr>
+          <a:xfrm>
+            <a:off x="369405" y="882829"/>
+            <a:ext cx="3518240" cy="3524941"/>
+          </a:xfrm>
+          <a:prstGeom prst="rect">
+            <a:avLst/>
+          </a:prstGeom>
+        </p:spPr>
+      </p:pic>
     </p:spTree>
     <p:extLst>
       <p:ext uri="{BB962C8B-B14F-4D97-AF65-F5344CB8AC3E}">

</xml_diff>